<commit_message>
Update logo with 2024 dates
</commit_message>
<xml_diff>
--- a/images/savethedate2024.pptx
+++ b/images/savethedate2024.pptx
@@ -104,6 +104,11 @@
       </a:defRPr>
     </a:lvl9pPr>
   </p:defaultTextStyle>
+  <p:extLst>
+    <p:ext uri="{EFAFB233-063F-42B5-8137-9DF3F51BA10A}">
+      <p15:sldGuideLst xmlns:p15="http://schemas.microsoft.com/office/powerpoint/2012/main"/>
+    </p:ext>
+  </p:extLst>
 </p:presentation>
 </file>
 
@@ -238,7 +243,7 @@
           <a:p>
             <a:fld id="{B987C3C6-3F4B-4927-8DB9-664747EAEC07}" type="datetimeFigureOut">
               <a:rPr lang="en-US" smtClean="0"/>
-              <a:t>10/10/2024</a:t>
+              <a:t>10/11/2024</a:t>
             </a:fld>
             <a:endParaRPr lang="en-US"/>
           </a:p>
@@ -408,7 +413,7 @@
           <a:p>
             <a:fld id="{B987C3C6-3F4B-4927-8DB9-664747EAEC07}" type="datetimeFigureOut">
               <a:rPr lang="en-US" smtClean="0"/>
-              <a:t>10/10/2024</a:t>
+              <a:t>10/11/2024</a:t>
             </a:fld>
             <a:endParaRPr lang="en-US"/>
           </a:p>
@@ -588,7 +593,7 @@
           <a:p>
             <a:fld id="{B987C3C6-3F4B-4927-8DB9-664747EAEC07}" type="datetimeFigureOut">
               <a:rPr lang="en-US" smtClean="0"/>
-              <a:t>10/10/2024</a:t>
+              <a:t>10/11/2024</a:t>
             </a:fld>
             <a:endParaRPr lang="en-US"/>
           </a:p>
@@ -758,7 +763,7 @@
           <a:p>
             <a:fld id="{B987C3C6-3F4B-4927-8DB9-664747EAEC07}" type="datetimeFigureOut">
               <a:rPr lang="en-US" smtClean="0"/>
-              <a:t>10/10/2024</a:t>
+              <a:t>10/11/2024</a:t>
             </a:fld>
             <a:endParaRPr lang="en-US"/>
           </a:p>
@@ -1004,7 +1009,7 @@
           <a:p>
             <a:fld id="{B987C3C6-3F4B-4927-8DB9-664747EAEC07}" type="datetimeFigureOut">
               <a:rPr lang="en-US" smtClean="0"/>
-              <a:t>10/10/2024</a:t>
+              <a:t>10/11/2024</a:t>
             </a:fld>
             <a:endParaRPr lang="en-US"/>
           </a:p>
@@ -1236,7 +1241,7 @@
           <a:p>
             <a:fld id="{B987C3C6-3F4B-4927-8DB9-664747EAEC07}" type="datetimeFigureOut">
               <a:rPr lang="en-US" smtClean="0"/>
-              <a:t>10/10/2024</a:t>
+              <a:t>10/11/2024</a:t>
             </a:fld>
             <a:endParaRPr lang="en-US"/>
           </a:p>
@@ -1603,7 +1608,7 @@
           <a:p>
             <a:fld id="{B987C3C6-3F4B-4927-8DB9-664747EAEC07}" type="datetimeFigureOut">
               <a:rPr lang="en-US" smtClean="0"/>
-              <a:t>10/10/2024</a:t>
+              <a:t>10/11/2024</a:t>
             </a:fld>
             <a:endParaRPr lang="en-US"/>
           </a:p>
@@ -1721,7 +1726,7 @@
           <a:p>
             <a:fld id="{B987C3C6-3F4B-4927-8DB9-664747EAEC07}" type="datetimeFigureOut">
               <a:rPr lang="en-US" smtClean="0"/>
-              <a:t>10/10/2024</a:t>
+              <a:t>10/11/2024</a:t>
             </a:fld>
             <a:endParaRPr lang="en-US"/>
           </a:p>
@@ -1816,7 +1821,7 @@
           <a:p>
             <a:fld id="{B987C3C6-3F4B-4927-8DB9-664747EAEC07}" type="datetimeFigureOut">
               <a:rPr lang="en-US" smtClean="0"/>
-              <a:t>10/10/2024</a:t>
+              <a:t>10/11/2024</a:t>
             </a:fld>
             <a:endParaRPr lang="en-US"/>
           </a:p>
@@ -2093,7 +2098,7 @@
           <a:p>
             <a:fld id="{B987C3C6-3F4B-4927-8DB9-664747EAEC07}" type="datetimeFigureOut">
               <a:rPr lang="en-US" smtClean="0"/>
-              <a:t>10/10/2024</a:t>
+              <a:t>10/11/2024</a:t>
             </a:fld>
             <a:endParaRPr lang="en-US"/>
           </a:p>
@@ -2350,7 +2355,7 @@
           <a:p>
             <a:fld id="{B987C3C6-3F4B-4927-8DB9-664747EAEC07}" type="datetimeFigureOut">
               <a:rPr lang="en-US" smtClean="0"/>
-              <a:t>10/10/2024</a:t>
+              <a:t>10/11/2024</a:t>
             </a:fld>
             <a:endParaRPr lang="en-US"/>
           </a:p>
@@ -2563,7 +2568,7 @@
           <a:p>
             <a:fld id="{B987C3C6-3F4B-4927-8DB9-664747EAEC07}" type="datetimeFigureOut">
               <a:rPr lang="en-US" smtClean="0"/>
-              <a:t>10/10/2024</a:t>
+              <a:t>10/11/2024</a:t>
             </a:fld>
             <a:endParaRPr lang="en-US"/>
           </a:p>
@@ -3146,10 +3151,10 @@
         </p:nvGrpSpPr>
         <p:grpSpPr>
           <a:xfrm>
-            <a:off x="1349785" y="4593054"/>
-            <a:ext cx="4379409" cy="2226923"/>
+            <a:off x="1349785" y="4593051"/>
+            <a:ext cx="4379409" cy="2289066"/>
             <a:chOff x="1546067" y="5271883"/>
-            <a:chExt cx="3022600" cy="1536988"/>
+            <a:chExt cx="3022600" cy="1579879"/>
           </a:xfrm>
         </p:grpSpPr>
         <p:pic>
@@ -3201,7 +3206,7 @@
           </p:nvSpPr>
           <p:spPr>
             <a:xfrm>
-              <a:off x="2033060" y="6150361"/>
+              <a:off x="2033060" y="6193252"/>
               <a:ext cx="2196627" cy="658510"/>
             </a:xfrm>
             <a:prstGeom prst="rect">

</xml_diff>

<commit_message>
Update the organizing committee
</commit_message>
<xml_diff>
--- a/images/savethedate2024.pptx
+++ b/images/savethedate2024.pptx
@@ -3151,10 +3151,10 @@
         </p:nvGrpSpPr>
         <p:grpSpPr>
           <a:xfrm>
-            <a:off x="1349785" y="4593051"/>
-            <a:ext cx="4379409" cy="2289066"/>
+            <a:off x="1376613" y="4671737"/>
+            <a:ext cx="4379409" cy="2262963"/>
             <a:chOff x="1546067" y="5271883"/>
-            <a:chExt cx="3022600" cy="1579879"/>
+            <a:chExt cx="3022600" cy="1561865"/>
           </a:xfrm>
         </p:grpSpPr>
         <p:pic>
@@ -3206,7 +3206,7 @@
           </p:nvSpPr>
           <p:spPr>
             <a:xfrm>
-              <a:off x="2033060" y="6193252"/>
+              <a:off x="2051355" y="6175238"/>
               <a:ext cx="2196627" cy="658510"/>
             </a:xfrm>
             <a:prstGeom prst="rect">
@@ -3661,6 +3661,96 @@
           </a:prstGeom>
         </p:spPr>
       </p:pic>
+      <p:sp>
+        <p:nvSpPr>
+          <p:cNvPr id="4" name="TextBox 3">
+            <a:extLst>
+              <a:ext uri="{FF2B5EF4-FFF2-40B4-BE49-F238E27FC236}">
+                <a16:creationId xmlns:a16="http://schemas.microsoft.com/office/drawing/2014/main" id="{512CE69C-626C-8067-8723-649B9CDEC3E7}"/>
+              </a:ext>
+            </a:extLst>
+          </p:cNvPr>
+          <p:cNvSpPr txBox="1"/>
+          <p:nvPr/>
+        </p:nvSpPr>
+        <p:spPr>
+          <a:xfrm>
+            <a:off x="5354844" y="6226814"/>
+            <a:ext cx="1792478" cy="461665"/>
+          </a:xfrm>
+          <a:prstGeom prst="rect">
+            <a:avLst/>
+          </a:prstGeom>
+          <a:noFill/>
+        </p:spPr>
+        <p:txBody>
+          <a:bodyPr wrap="none" rtlCol="0">
+            <a:spAutoFit/>
+          </a:bodyPr>
+          <a:lstStyle/>
+          <a:p>
+            <a:pPr algn="ctr"/>
+            <a:r>
+              <a:rPr lang="en-US" sz="1200" b="1" u="sng" dirty="0"/>
+              <a:t>Visit our website</a:t>
+            </a:r>
+          </a:p>
+          <a:p>
+            <a:pPr algn="ctr"/>
+            <a:r>
+              <a:rPr lang="en-US" sz="1200" b="1" u="sng" dirty="0"/>
+              <a:t>for details and updates</a:t>
+            </a:r>
+            <a:endParaRPr lang="en-US" dirty="0"/>
+          </a:p>
+        </p:txBody>
+      </p:sp>
+      <p:pic>
+        <p:nvPicPr>
+          <p:cNvPr id="7" name="Picture 6" descr="A qr code with cartoon characters&#10;&#10;Description automatically generated">
+            <a:extLst>
+              <a:ext uri="{FF2B5EF4-FFF2-40B4-BE49-F238E27FC236}">
+                <a16:creationId xmlns:a16="http://schemas.microsoft.com/office/drawing/2014/main" id="{F7B432E7-5A2E-1009-C100-705428082BBE}"/>
+              </a:ext>
+            </a:extLst>
+          </p:cNvPr>
+          <p:cNvPicPr>
+            <a:picLocks noChangeAspect="1"/>
+          </p:cNvPicPr>
+          <p:nvPr/>
+        </p:nvPicPr>
+        <p:blipFill>
+          <a:blip r:embed="rId7">
+            <a:clrChange>
+              <a:clrFrom>
+                <a:srgbClr val="FFFFFF"/>
+              </a:clrFrom>
+              <a:clrTo>
+                <a:srgbClr val="FFFFFF">
+                  <a:alpha val="0"/>
+                </a:srgbClr>
+              </a:clrTo>
+            </a:clrChange>
+            <a:extLst>
+              <a:ext uri="{28A0092B-C50C-407E-A947-70E740481C1C}">
+                <a14:useLocalDpi xmlns:a14="http://schemas.microsoft.com/office/drawing/2010/main" val="0"/>
+              </a:ext>
+            </a:extLst>
+          </a:blip>
+          <a:stretch>
+            <a:fillRect/>
+          </a:stretch>
+        </p:blipFill>
+        <p:spPr>
+          <a:xfrm>
+            <a:off x="5574807" y="6624160"/>
+            <a:ext cx="1352550" cy="1352550"/>
+          </a:xfrm>
+          <a:prstGeom prst="rect">
+            <a:avLst/>
+          </a:prstGeom>
+        </p:spPr>
+      </p:pic>
     </p:spTree>
     <p:extLst>
       <p:ext uri="{BB962C8B-B14F-4D97-AF65-F5344CB8AC3E}">

</xml_diff>

<commit_message>
Update with SickKids's logo
</commit_message>
<xml_diff>
--- a/images/savethedate2024.pptx
+++ b/images/savethedate2024.pptx
@@ -243,7 +243,7 @@
           <a:p>
             <a:fld id="{B987C3C6-3F4B-4927-8DB9-664747EAEC07}" type="datetimeFigureOut">
               <a:rPr lang="en-US" smtClean="0"/>
-              <a:t>10/11/2024</a:t>
+              <a:t>10/17/2024</a:t>
             </a:fld>
             <a:endParaRPr lang="en-US"/>
           </a:p>
@@ -413,7 +413,7 @@
           <a:p>
             <a:fld id="{B987C3C6-3F4B-4927-8DB9-664747EAEC07}" type="datetimeFigureOut">
               <a:rPr lang="en-US" smtClean="0"/>
-              <a:t>10/11/2024</a:t>
+              <a:t>10/17/2024</a:t>
             </a:fld>
             <a:endParaRPr lang="en-US"/>
           </a:p>
@@ -593,7 +593,7 @@
           <a:p>
             <a:fld id="{B987C3C6-3F4B-4927-8DB9-664747EAEC07}" type="datetimeFigureOut">
               <a:rPr lang="en-US" smtClean="0"/>
-              <a:t>10/11/2024</a:t>
+              <a:t>10/17/2024</a:t>
             </a:fld>
             <a:endParaRPr lang="en-US"/>
           </a:p>
@@ -763,7 +763,7 @@
           <a:p>
             <a:fld id="{B987C3C6-3F4B-4927-8DB9-664747EAEC07}" type="datetimeFigureOut">
               <a:rPr lang="en-US" smtClean="0"/>
-              <a:t>10/11/2024</a:t>
+              <a:t>10/17/2024</a:t>
             </a:fld>
             <a:endParaRPr lang="en-US"/>
           </a:p>
@@ -1009,7 +1009,7 @@
           <a:p>
             <a:fld id="{B987C3C6-3F4B-4927-8DB9-664747EAEC07}" type="datetimeFigureOut">
               <a:rPr lang="en-US" smtClean="0"/>
-              <a:t>10/11/2024</a:t>
+              <a:t>10/17/2024</a:t>
             </a:fld>
             <a:endParaRPr lang="en-US"/>
           </a:p>
@@ -1241,7 +1241,7 @@
           <a:p>
             <a:fld id="{B987C3C6-3F4B-4927-8DB9-664747EAEC07}" type="datetimeFigureOut">
               <a:rPr lang="en-US" smtClean="0"/>
-              <a:t>10/11/2024</a:t>
+              <a:t>10/17/2024</a:t>
             </a:fld>
             <a:endParaRPr lang="en-US"/>
           </a:p>
@@ -1608,7 +1608,7 @@
           <a:p>
             <a:fld id="{B987C3C6-3F4B-4927-8DB9-664747EAEC07}" type="datetimeFigureOut">
               <a:rPr lang="en-US" smtClean="0"/>
-              <a:t>10/11/2024</a:t>
+              <a:t>10/17/2024</a:t>
             </a:fld>
             <a:endParaRPr lang="en-US"/>
           </a:p>
@@ -1726,7 +1726,7 @@
           <a:p>
             <a:fld id="{B987C3C6-3F4B-4927-8DB9-664747EAEC07}" type="datetimeFigureOut">
               <a:rPr lang="en-US" smtClean="0"/>
-              <a:t>10/11/2024</a:t>
+              <a:t>10/17/2024</a:t>
             </a:fld>
             <a:endParaRPr lang="en-US"/>
           </a:p>
@@ -1821,7 +1821,7 @@
           <a:p>
             <a:fld id="{B987C3C6-3F4B-4927-8DB9-664747EAEC07}" type="datetimeFigureOut">
               <a:rPr lang="en-US" smtClean="0"/>
-              <a:t>10/11/2024</a:t>
+              <a:t>10/17/2024</a:t>
             </a:fld>
             <a:endParaRPr lang="en-US"/>
           </a:p>
@@ -2098,7 +2098,7 @@
           <a:p>
             <a:fld id="{B987C3C6-3F4B-4927-8DB9-664747EAEC07}" type="datetimeFigureOut">
               <a:rPr lang="en-US" smtClean="0"/>
-              <a:t>10/11/2024</a:t>
+              <a:t>10/17/2024</a:t>
             </a:fld>
             <a:endParaRPr lang="en-US"/>
           </a:p>
@@ -2355,7 +2355,7 @@
           <a:p>
             <a:fld id="{B987C3C6-3F4B-4927-8DB9-664747EAEC07}" type="datetimeFigureOut">
               <a:rPr lang="en-US" smtClean="0"/>
-              <a:t>10/11/2024</a:t>
+              <a:t>10/17/2024</a:t>
             </a:fld>
             <a:endParaRPr lang="en-US"/>
           </a:p>
@@ -2568,7 +2568,7 @@
           <a:p>
             <a:fld id="{B987C3C6-3F4B-4927-8DB9-664747EAEC07}" type="datetimeFigureOut">
               <a:rPr lang="en-US" smtClean="0"/>
-              <a:t>10/11/2024</a:t>
+              <a:t>10/17/2024</a:t>
             </a:fld>
             <a:endParaRPr lang="en-US"/>
           </a:p>
@@ -3608,53 +3608,8 @@
         </p:blipFill>
         <p:spPr>
           <a:xfrm>
-            <a:off x="4729800" y="8197517"/>
+            <a:off x="4784392" y="8197517"/>
             <a:ext cx="2288538" cy="912844"/>
-          </a:xfrm>
-          <a:prstGeom prst="rect">
-            <a:avLst/>
-          </a:prstGeom>
-        </p:spPr>
-      </p:pic>
-      <p:pic>
-        <p:nvPicPr>
-          <p:cNvPr id="21" name="Picture 20" descr="A close-up of a logo&#10;&#10;Description automatically generated">
-            <a:extLst>
-              <a:ext uri="{FF2B5EF4-FFF2-40B4-BE49-F238E27FC236}">
-                <a16:creationId xmlns:a16="http://schemas.microsoft.com/office/drawing/2014/main" id="{552720D0-FF3C-263D-FE2E-9A5B25EB9DD3}"/>
-              </a:ext>
-            </a:extLst>
-          </p:cNvPr>
-          <p:cNvPicPr>
-            <a:picLocks noChangeAspect="1"/>
-          </p:cNvPicPr>
-          <p:nvPr/>
-        </p:nvPicPr>
-        <p:blipFill>
-          <a:blip r:embed="rId6">
-            <a:clrChange>
-              <a:clrFrom>
-                <a:srgbClr val="FFFFFF"/>
-              </a:clrFrom>
-              <a:clrTo>
-                <a:srgbClr val="FFFFFF">
-                  <a:alpha val="0"/>
-                </a:srgbClr>
-              </a:clrTo>
-            </a:clrChange>
-            <a:extLst>
-              <a:ext uri="{28A0092B-C50C-407E-A947-70E740481C1C}">
-                <a14:useLocalDpi xmlns:a14="http://schemas.microsoft.com/office/drawing/2010/main" val="0"/>
-              </a:ext>
-            </a:extLst>
-          </a:blip>
-          <a:srcRect t="56546"/>
-          <a:stretch/>
-        </p:blipFill>
-        <p:spPr>
-          <a:xfrm>
-            <a:off x="2559207" y="8193136"/>
-            <a:ext cx="2120900" cy="921606"/>
           </a:xfrm>
           <a:prstGeom prst="rect">
             <a:avLst/>
@@ -3720,7 +3675,7 @@
           <p:nvPr/>
         </p:nvPicPr>
         <p:blipFill>
-          <a:blip r:embed="rId7">
+          <a:blip r:embed="rId6">
             <a:clrChange>
               <a:clrFrom>
                 <a:srgbClr val="FFFFFF"/>
@@ -3751,6 +3706,183 @@
           </a:prstGeom>
         </p:spPr>
       </p:pic>
+      <p:grpSp>
+        <p:nvGrpSpPr>
+          <p:cNvPr id="16" name="Group 15">
+            <a:extLst>
+              <a:ext uri="{FF2B5EF4-FFF2-40B4-BE49-F238E27FC236}">
+                <a16:creationId xmlns:a16="http://schemas.microsoft.com/office/drawing/2014/main" id="{9FCE3814-B2F6-C5E0-8313-CE62374EB5A3}"/>
+              </a:ext>
+            </a:extLst>
+          </p:cNvPr>
+          <p:cNvGrpSpPr/>
+          <p:nvPr/>
+        </p:nvGrpSpPr>
+        <p:grpSpPr>
+          <a:xfrm>
+            <a:off x="2562647" y="7972998"/>
+            <a:ext cx="2122547" cy="1240523"/>
+            <a:chOff x="2492954" y="7888203"/>
+            <a:chExt cx="2163217" cy="1264293"/>
+          </a:xfrm>
+        </p:grpSpPr>
+        <p:pic>
+          <p:nvPicPr>
+            <p:cNvPr id="21" name="Picture 20" descr="A close-up of a logo&#10;&#10;Description automatically generated">
+              <a:extLst>
+                <a:ext uri="{FF2B5EF4-FFF2-40B4-BE49-F238E27FC236}">
+                  <a16:creationId xmlns:a16="http://schemas.microsoft.com/office/drawing/2014/main" id="{552720D0-FF3C-263D-FE2E-9A5B25EB9DD3}"/>
+                </a:ext>
+              </a:extLst>
+            </p:cNvPr>
+            <p:cNvPicPr>
+              <a:picLocks noChangeAspect="1"/>
+            </p:cNvPicPr>
+            <p:nvPr/>
+          </p:nvPicPr>
+          <p:blipFill>
+            <a:blip r:embed="rId7">
+              <a:clrChange>
+                <a:clrFrom>
+                  <a:srgbClr val="FFFFFF"/>
+                </a:clrFrom>
+                <a:clrTo>
+                  <a:srgbClr val="FFFFFF">
+                    <a:alpha val="0"/>
+                  </a:srgbClr>
+                </a:clrTo>
+              </a:clrChange>
+              <a:extLst>
+                <a:ext uri="{28A0092B-C50C-407E-A947-70E740481C1C}">
+                  <a14:useLocalDpi xmlns:a14="http://schemas.microsoft.com/office/drawing/2010/main" val="0"/>
+                </a:ext>
+              </a:extLst>
+            </a:blip>
+            <a:srcRect t="56546"/>
+            <a:stretch/>
+          </p:blipFill>
+          <p:spPr>
+            <a:xfrm>
+              <a:off x="2514112" y="7888203"/>
+              <a:ext cx="2120900" cy="921606"/>
+            </a:xfrm>
+            <a:prstGeom prst="rect">
+              <a:avLst/>
+            </a:prstGeom>
+          </p:spPr>
+        </p:pic>
+        <p:grpSp>
+          <p:nvGrpSpPr>
+            <p:cNvPr id="10" name="Group 9">
+              <a:extLst>
+                <a:ext uri="{FF2B5EF4-FFF2-40B4-BE49-F238E27FC236}">
+                  <a16:creationId xmlns:a16="http://schemas.microsoft.com/office/drawing/2014/main" id="{55BEAB3F-CDAA-B45C-769B-0CE3A834834C}"/>
+                </a:ext>
+              </a:extLst>
+            </p:cNvPr>
+            <p:cNvGrpSpPr/>
+            <p:nvPr/>
+          </p:nvGrpSpPr>
+          <p:grpSpPr>
+            <a:xfrm>
+              <a:off x="2492954" y="8676050"/>
+              <a:ext cx="2163217" cy="476446"/>
+              <a:chOff x="2492954" y="8676050"/>
+              <a:chExt cx="2163217" cy="476446"/>
+            </a:xfrm>
+          </p:grpSpPr>
+          <p:pic>
+            <p:nvPicPr>
+              <p:cNvPr id="3" name="Picture 2" descr="Close-up of a logo&#10;&#10;Description automatically generated">
+                <a:extLst>
+                  <a:ext uri="{FF2B5EF4-FFF2-40B4-BE49-F238E27FC236}">
+                    <a16:creationId xmlns:a16="http://schemas.microsoft.com/office/drawing/2014/main" id="{224C6422-9802-6418-1487-49A3095B6515}"/>
+                  </a:ext>
+                </a:extLst>
+              </p:cNvPr>
+              <p:cNvPicPr>
+                <a:picLocks noChangeAspect="1"/>
+              </p:cNvPicPr>
+              <p:nvPr/>
+            </p:nvPicPr>
+            <p:blipFill>
+              <a:blip r:embed="rId8">
+                <a:clrChange>
+                  <a:clrFrom>
+                    <a:srgbClr val="FCFEFF"/>
+                  </a:clrFrom>
+                  <a:clrTo>
+                    <a:srgbClr val="FCFEFF">
+                      <a:alpha val="0"/>
+                    </a:srgbClr>
+                  </a:clrTo>
+                </a:clrChange>
+                <a:extLst>
+                  <a:ext uri="{28A0092B-C50C-407E-A947-70E740481C1C}">
+                    <a14:useLocalDpi xmlns:a14="http://schemas.microsoft.com/office/drawing/2010/main" val="0"/>
+                  </a:ext>
+                </a:extLst>
+              </a:blip>
+              <a:srcRect t="37427" r="34597" b="28220"/>
+              <a:stretch/>
+            </p:blipFill>
+            <p:spPr>
+              <a:xfrm>
+                <a:off x="2492954" y="8756984"/>
+                <a:ext cx="1018271" cy="395512"/>
+              </a:xfrm>
+              <a:prstGeom prst="rect">
+                <a:avLst/>
+              </a:prstGeom>
+            </p:spPr>
+          </p:pic>
+          <p:pic>
+            <p:nvPicPr>
+              <p:cNvPr id="9" name="Picture 8" descr="Close-up of a logo&#10;&#10;Description automatically generated">
+                <a:extLst>
+                  <a:ext uri="{FF2B5EF4-FFF2-40B4-BE49-F238E27FC236}">
+                    <a16:creationId xmlns:a16="http://schemas.microsoft.com/office/drawing/2014/main" id="{D2D6B2D7-43A7-6B8A-C732-526B69CFE5E6}"/>
+                  </a:ext>
+                </a:extLst>
+              </p:cNvPr>
+              <p:cNvPicPr>
+                <a:picLocks noChangeAspect="1"/>
+              </p:cNvPicPr>
+              <p:nvPr/>
+            </p:nvPicPr>
+            <p:blipFill>
+              <a:blip r:embed="rId8">
+                <a:clrChange>
+                  <a:clrFrom>
+                    <a:srgbClr val="FCFEFF"/>
+                  </a:clrFrom>
+                  <a:clrTo>
+                    <a:srgbClr val="FCFEFF">
+                      <a:alpha val="0"/>
+                    </a:srgbClr>
+                  </a:clrTo>
+                </a:clrChange>
+                <a:extLst>
+                  <a:ext uri="{28A0092B-C50C-407E-A947-70E740481C1C}">
+                    <a14:useLocalDpi xmlns:a14="http://schemas.microsoft.com/office/drawing/2010/main" val="0"/>
+                  </a:ext>
+                </a:extLst>
+              </a:blip>
+              <a:srcRect l="32345" t="69820"/>
+              <a:stretch/>
+            </p:blipFill>
+            <p:spPr>
+              <a:xfrm>
+                <a:off x="3382190" y="8676050"/>
+                <a:ext cx="1273981" cy="420263"/>
+              </a:xfrm>
+              <a:prstGeom prst="rect">
+                <a:avLst/>
+              </a:prstGeom>
+            </p:spPr>
+          </p:pic>
+        </p:grpSp>
+      </p:grpSp>
     </p:spTree>
     <p:extLst>
       <p:ext uri="{BB962C8B-B14F-4D97-AF65-F5344CB8AC3E}">

</xml_diff>

<commit_message>
Update profile and banner
</commit_message>
<xml_diff>
--- a/images/savethedate2024.pptx
+++ b/images/savethedate2024.pptx
@@ -243,7 +243,7 @@
           <a:p>
             <a:fld id="{B987C3C6-3F4B-4927-8DB9-664747EAEC07}" type="datetimeFigureOut">
               <a:rPr lang="en-US" smtClean="0"/>
-              <a:t>10/17/2024</a:t>
+              <a:t>11/4/2024</a:t>
             </a:fld>
             <a:endParaRPr lang="en-US"/>
           </a:p>
@@ -413,7 +413,7 @@
           <a:p>
             <a:fld id="{B987C3C6-3F4B-4927-8DB9-664747EAEC07}" type="datetimeFigureOut">
               <a:rPr lang="en-US" smtClean="0"/>
-              <a:t>10/17/2024</a:t>
+              <a:t>11/4/2024</a:t>
             </a:fld>
             <a:endParaRPr lang="en-US"/>
           </a:p>
@@ -593,7 +593,7 @@
           <a:p>
             <a:fld id="{B987C3C6-3F4B-4927-8DB9-664747EAEC07}" type="datetimeFigureOut">
               <a:rPr lang="en-US" smtClean="0"/>
-              <a:t>10/17/2024</a:t>
+              <a:t>11/4/2024</a:t>
             </a:fld>
             <a:endParaRPr lang="en-US"/>
           </a:p>
@@ -763,7 +763,7 @@
           <a:p>
             <a:fld id="{B987C3C6-3F4B-4927-8DB9-664747EAEC07}" type="datetimeFigureOut">
               <a:rPr lang="en-US" smtClean="0"/>
-              <a:t>10/17/2024</a:t>
+              <a:t>11/4/2024</a:t>
             </a:fld>
             <a:endParaRPr lang="en-US"/>
           </a:p>
@@ -1009,7 +1009,7 @@
           <a:p>
             <a:fld id="{B987C3C6-3F4B-4927-8DB9-664747EAEC07}" type="datetimeFigureOut">
               <a:rPr lang="en-US" smtClean="0"/>
-              <a:t>10/17/2024</a:t>
+              <a:t>11/4/2024</a:t>
             </a:fld>
             <a:endParaRPr lang="en-US"/>
           </a:p>
@@ -1241,7 +1241,7 @@
           <a:p>
             <a:fld id="{B987C3C6-3F4B-4927-8DB9-664747EAEC07}" type="datetimeFigureOut">
               <a:rPr lang="en-US" smtClean="0"/>
-              <a:t>10/17/2024</a:t>
+              <a:t>11/4/2024</a:t>
             </a:fld>
             <a:endParaRPr lang="en-US"/>
           </a:p>
@@ -1608,7 +1608,7 @@
           <a:p>
             <a:fld id="{B987C3C6-3F4B-4927-8DB9-664747EAEC07}" type="datetimeFigureOut">
               <a:rPr lang="en-US" smtClean="0"/>
-              <a:t>10/17/2024</a:t>
+              <a:t>11/4/2024</a:t>
             </a:fld>
             <a:endParaRPr lang="en-US"/>
           </a:p>
@@ -1726,7 +1726,7 @@
           <a:p>
             <a:fld id="{B987C3C6-3F4B-4927-8DB9-664747EAEC07}" type="datetimeFigureOut">
               <a:rPr lang="en-US" smtClean="0"/>
-              <a:t>10/17/2024</a:t>
+              <a:t>11/4/2024</a:t>
             </a:fld>
             <a:endParaRPr lang="en-US"/>
           </a:p>
@@ -1821,7 +1821,7 @@
           <a:p>
             <a:fld id="{B987C3C6-3F4B-4927-8DB9-664747EAEC07}" type="datetimeFigureOut">
               <a:rPr lang="en-US" smtClean="0"/>
-              <a:t>10/17/2024</a:t>
+              <a:t>11/4/2024</a:t>
             </a:fld>
             <a:endParaRPr lang="en-US"/>
           </a:p>
@@ -2098,7 +2098,7 @@
           <a:p>
             <a:fld id="{B987C3C6-3F4B-4927-8DB9-664747EAEC07}" type="datetimeFigureOut">
               <a:rPr lang="en-US" smtClean="0"/>
-              <a:t>10/17/2024</a:t>
+              <a:t>11/4/2024</a:t>
             </a:fld>
             <a:endParaRPr lang="en-US"/>
           </a:p>
@@ -2355,7 +2355,7 @@
           <a:p>
             <a:fld id="{B987C3C6-3F4B-4927-8DB9-664747EAEC07}" type="datetimeFigureOut">
               <a:rPr lang="en-US" smtClean="0"/>
-              <a:t>10/17/2024</a:t>
+              <a:t>11/4/2024</a:t>
             </a:fld>
             <a:endParaRPr lang="en-US"/>
           </a:p>
@@ -2568,7 +2568,7 @@
           <a:p>
             <a:fld id="{B987C3C6-3F4B-4927-8DB9-664747EAEC07}" type="datetimeFigureOut">
               <a:rPr lang="en-US" smtClean="0"/>
-              <a:t>10/17/2024</a:t>
+              <a:t>11/4/2024</a:t>
             </a:fld>
             <a:endParaRPr lang="en-US"/>
           </a:p>
@@ -3349,7 +3349,7 @@
               <a:pPr algn="ctr"/>
               <a:r>
                 <a:rPr lang="en-US" dirty="0"/>
-                <a:t>If you are interested in </a:t>
+                <a:t>If you are interested in the </a:t>
               </a:r>
               <a:r>
                 <a:rPr lang="en-US" b="1" dirty="0"/>
@@ -3399,7 +3399,7 @@
               </a:r>
               <a:r>
                 <a:rPr lang="en-US" dirty="0"/>
-                <a:t> about brain,</a:t>
+                <a:t> about the brain,</a:t>
               </a:r>
             </a:p>
             <a:p>
@@ -3410,7 +3410,7 @@
               </a:r>
               <a:r>
                 <a:rPr lang="en-US" dirty="0"/>
-                <a:t> about brain,</a:t>
+                <a:t> about the brain,</a:t>
               </a:r>
             </a:p>
             <a:p>
@@ -3447,7 +3447,7 @@
               </a:r>
               <a:r>
                 <a:rPr lang="en-US" dirty="0"/>
-                <a:t>for brain.</a:t>
+                <a:t>for the brain.</a:t>
               </a:r>
             </a:p>
             <a:p>

</xml_diff>

<commit_message>
Update flyer and committee
</commit_message>
<xml_diff>
--- a/images/savethedate2024.pptx
+++ b/images/savethedate2024.pptx
@@ -3380,7 +3380,7 @@
               </a:r>
               <a:r>
                 <a:rPr lang="en-US" i="1" dirty="0"/>
-                <a:t>@ Toronto </a:t>
+                <a:t>Toronto 2024 </a:t>
               </a:r>
               <a:r>
                 <a:rPr lang="en-US" dirty="0"/>
@@ -3466,7 +3466,7 @@
               </a:r>
               <a:r>
                 <a:rPr lang="en-US" dirty="0"/>
-                <a:t>, with </a:t>
+                <a:t>, </a:t>
               </a:r>
               <a:r>
                 <a:rPr lang="en-US" b="1" dirty="0"/>
@@ -3481,7 +3481,7 @@
               <a:pPr algn="ctr"/>
               <a:r>
                 <a:rPr lang="en-US" dirty="0"/>
-                <a:t>or just with </a:t>
+                <a:t>or just your </a:t>
               </a:r>
               <a:r>
                 <a:rPr lang="en-US" b="1" dirty="0"/>
@@ -3507,7 +3507,7 @@
               <a:pPr algn="ctr"/>
               <a:r>
                 <a:rPr lang="en-US" dirty="0"/>
-                <a:t>Registration will open soon!</a:t>
+                <a:t>Registration will open soon.</a:t>
               </a:r>
             </a:p>
             <a:p>

</xml_diff>